<commit_message>
Tree & Rock Update
</commit_message>
<xml_diff>
--- a/media/survivEE.pptx
+++ b/media/survivEE.pptx
@@ -6,7 +6,9 @@
   </p:sldMasterIdLst>
   <p:sldIdLst>
     <p:sldId id="256" r:id="rId2"/>
-    <p:sldId id="257" r:id="rId3"/>
+    <p:sldId id="259" r:id="rId3"/>
+    <p:sldId id="257" r:id="rId4"/>
+    <p:sldId id="258" r:id="rId5"/>
   </p:sldIdLst>
   <p:sldSz cx="12192000" cy="6858000"/>
   <p:notesSz cx="6858000" cy="9144000"/>
@@ -244,7 +246,7 @@
           <a:p>
             <a:fld id="{53AECEED-77F7-4C49-B070-DA58E18B350F}" type="datetimeFigureOut">
               <a:rPr kumimoji="1" lang="zh-TW" altLang="en-US" smtClean="0"/>
-              <a:t>2019/1/3</a:t>
+              <a:t>2019/1/4</a:t>
             </a:fld>
             <a:endParaRPr kumimoji="1" lang="zh-TW" altLang="en-US"/>
           </a:p>
@@ -414,7 +416,7 @@
           <a:p>
             <a:fld id="{53AECEED-77F7-4C49-B070-DA58E18B350F}" type="datetimeFigureOut">
               <a:rPr kumimoji="1" lang="zh-TW" altLang="en-US" smtClean="0"/>
-              <a:t>2019/1/3</a:t>
+              <a:t>2019/1/4</a:t>
             </a:fld>
             <a:endParaRPr kumimoji="1" lang="zh-TW" altLang="en-US"/>
           </a:p>
@@ -594,7 +596,7 @@
           <a:p>
             <a:fld id="{53AECEED-77F7-4C49-B070-DA58E18B350F}" type="datetimeFigureOut">
               <a:rPr kumimoji="1" lang="zh-TW" altLang="en-US" smtClean="0"/>
-              <a:t>2019/1/3</a:t>
+              <a:t>2019/1/4</a:t>
             </a:fld>
             <a:endParaRPr kumimoji="1" lang="zh-TW" altLang="en-US"/>
           </a:p>
@@ -764,7 +766,7 @@
           <a:p>
             <a:fld id="{53AECEED-77F7-4C49-B070-DA58E18B350F}" type="datetimeFigureOut">
               <a:rPr kumimoji="1" lang="zh-TW" altLang="en-US" smtClean="0"/>
-              <a:t>2019/1/3</a:t>
+              <a:t>2019/1/4</a:t>
             </a:fld>
             <a:endParaRPr kumimoji="1" lang="zh-TW" altLang="en-US"/>
           </a:p>
@@ -1010,7 +1012,7 @@
           <a:p>
             <a:fld id="{53AECEED-77F7-4C49-B070-DA58E18B350F}" type="datetimeFigureOut">
               <a:rPr kumimoji="1" lang="zh-TW" altLang="en-US" smtClean="0"/>
-              <a:t>2019/1/3</a:t>
+              <a:t>2019/1/4</a:t>
             </a:fld>
             <a:endParaRPr kumimoji="1" lang="zh-TW" altLang="en-US"/>
           </a:p>
@@ -1242,7 +1244,7 @@
           <a:p>
             <a:fld id="{53AECEED-77F7-4C49-B070-DA58E18B350F}" type="datetimeFigureOut">
               <a:rPr kumimoji="1" lang="zh-TW" altLang="en-US" smtClean="0"/>
-              <a:t>2019/1/3</a:t>
+              <a:t>2019/1/4</a:t>
             </a:fld>
             <a:endParaRPr kumimoji="1" lang="zh-TW" altLang="en-US"/>
           </a:p>
@@ -1609,7 +1611,7 @@
           <a:p>
             <a:fld id="{53AECEED-77F7-4C49-B070-DA58E18B350F}" type="datetimeFigureOut">
               <a:rPr kumimoji="1" lang="zh-TW" altLang="en-US" smtClean="0"/>
-              <a:t>2019/1/3</a:t>
+              <a:t>2019/1/4</a:t>
             </a:fld>
             <a:endParaRPr kumimoji="1" lang="zh-TW" altLang="en-US"/>
           </a:p>
@@ -1727,7 +1729,7 @@
           <a:p>
             <a:fld id="{53AECEED-77F7-4C49-B070-DA58E18B350F}" type="datetimeFigureOut">
               <a:rPr kumimoji="1" lang="zh-TW" altLang="en-US" smtClean="0"/>
-              <a:t>2019/1/3</a:t>
+              <a:t>2019/1/4</a:t>
             </a:fld>
             <a:endParaRPr kumimoji="1" lang="zh-TW" altLang="en-US"/>
           </a:p>
@@ -1822,7 +1824,7 @@
           <a:p>
             <a:fld id="{53AECEED-77F7-4C49-B070-DA58E18B350F}" type="datetimeFigureOut">
               <a:rPr kumimoji="1" lang="zh-TW" altLang="en-US" smtClean="0"/>
-              <a:t>2019/1/3</a:t>
+              <a:t>2019/1/4</a:t>
             </a:fld>
             <a:endParaRPr kumimoji="1" lang="zh-TW" altLang="en-US"/>
           </a:p>
@@ -2099,7 +2101,7 @@
           <a:p>
             <a:fld id="{53AECEED-77F7-4C49-B070-DA58E18B350F}" type="datetimeFigureOut">
               <a:rPr kumimoji="1" lang="zh-TW" altLang="en-US" smtClean="0"/>
-              <a:t>2019/1/3</a:t>
+              <a:t>2019/1/4</a:t>
             </a:fld>
             <a:endParaRPr kumimoji="1" lang="zh-TW" altLang="en-US"/>
           </a:p>
@@ -2352,7 +2354,7 @@
           <a:p>
             <a:fld id="{53AECEED-77F7-4C49-B070-DA58E18B350F}" type="datetimeFigureOut">
               <a:rPr kumimoji="1" lang="zh-TW" altLang="en-US" smtClean="0"/>
-              <a:t>2019/1/3</a:t>
+              <a:t>2019/1/4</a:t>
             </a:fld>
             <a:endParaRPr kumimoji="1" lang="zh-TW" altLang="en-US"/>
           </a:p>
@@ -2565,7 +2567,7 @@
           <a:p>
             <a:fld id="{53AECEED-77F7-4C49-B070-DA58E18B350F}" type="datetimeFigureOut">
               <a:rPr kumimoji="1" lang="zh-TW" altLang="en-US" smtClean="0"/>
-              <a:t>2019/1/3</a:t>
+              <a:t>2019/1/4</a:t>
             </a:fld>
             <a:endParaRPr kumimoji="1" lang="zh-TW" altLang="en-US"/>
           </a:p>
@@ -2983,16 +2985,16 @@
       </p:grpSpPr>
       <p:grpSp>
         <p:nvGrpSpPr>
-          <p:cNvPr id="85" name="群組 84"/>
+          <p:cNvPr id="12" name="群組 11"/>
           <p:cNvGrpSpPr/>
           <p:nvPr/>
         </p:nvGrpSpPr>
         <p:grpSpPr>
           <a:xfrm>
-            <a:off x="1400499" y="905190"/>
-            <a:ext cx="556889" cy="545574"/>
-            <a:chOff x="4722019" y="3224689"/>
-            <a:chExt cx="914400" cy="914400"/>
+            <a:off x="0" y="364358"/>
+            <a:ext cx="360000" cy="360000"/>
+            <a:chOff x="2186308" y="1161419"/>
+            <a:chExt cx="360000" cy="360000"/>
           </a:xfrm>
         </p:grpSpPr>
         <p:sp>
@@ -3003,8 +3005,8 @@
           </p:nvSpPr>
           <p:spPr>
             <a:xfrm>
-              <a:off x="5000625" y="3503295"/>
-              <a:ext cx="357188" cy="357188"/>
+              <a:off x="2312308" y="1287419"/>
+              <a:ext cx="108000" cy="108000"/>
             </a:xfrm>
             <a:prstGeom prst="ellipse">
               <a:avLst/>
@@ -3053,8 +3055,8 @@
           </p:nvSpPr>
           <p:spPr>
             <a:xfrm>
-              <a:off x="4722019" y="3224689"/>
-              <a:ext cx="914400" cy="914400"/>
+              <a:off x="2186308" y="1161419"/>
+              <a:ext cx="360000" cy="360000"/>
             </a:xfrm>
             <a:prstGeom prst="cloud">
               <a:avLst/>
@@ -3098,57 +3100,6 @@
           </p:txBody>
         </p:sp>
       </p:grpSp>
-      <p:sp>
-        <p:nvSpPr>
-          <p:cNvPr id="202" name="橢圓 201"/>
-          <p:cNvSpPr/>
-          <p:nvPr/>
-        </p:nvSpPr>
-        <p:spPr>
-          <a:xfrm>
-            <a:off x="2117859" y="480631"/>
-            <a:ext cx="351630" cy="304322"/>
-          </a:xfrm>
-          <a:prstGeom prst="ellipse">
-            <a:avLst/>
-          </a:prstGeom>
-          <a:solidFill>
-            <a:schemeClr val="accent3"/>
-          </a:solidFill>
-          <a:ln>
-            <a:solidFill>
-              <a:schemeClr val="tx1">
-                <a:lumMod val="65000"/>
-                <a:lumOff val="35000"/>
-              </a:schemeClr>
-            </a:solidFill>
-          </a:ln>
-        </p:spPr>
-        <p:style>
-          <a:lnRef idx="2">
-            <a:schemeClr val="accent1">
-              <a:shade val="50000"/>
-            </a:schemeClr>
-          </a:lnRef>
-          <a:fillRef idx="1">
-            <a:schemeClr val="accent1"/>
-          </a:fillRef>
-          <a:effectRef idx="0">
-            <a:schemeClr val="accent1"/>
-          </a:effectRef>
-          <a:fontRef idx="minor">
-            <a:schemeClr val="lt1"/>
-          </a:fontRef>
-        </p:style>
-        <p:txBody>
-          <a:bodyPr rtlCol="0" anchor="ctr"/>
-          <a:lstStyle/>
-          <a:p>
-            <a:pPr algn="ctr"/>
-            <a:endParaRPr kumimoji="1" lang="zh-TW" altLang="en-US"/>
-          </a:p>
-        </p:txBody>
-      </p:sp>
       <p:grpSp>
         <p:nvGrpSpPr>
           <p:cNvPr id="357" name="群組 356"/>
@@ -3157,7 +3108,7 @@
         </p:nvGrpSpPr>
         <p:grpSpPr>
           <a:xfrm>
-            <a:off x="2841537" y="2348866"/>
+            <a:off x="2994791" y="2183766"/>
             <a:ext cx="3931212" cy="3563596"/>
             <a:chOff x="2841537" y="2348866"/>
             <a:chExt cx="3931212" cy="3563596"/>
@@ -6180,9 +6131,9 @@
         </p:nvGrpSpPr>
         <p:grpSpPr>
           <a:xfrm>
-            <a:off x="7525181" y="573395"/>
-            <a:ext cx="478481" cy="331795"/>
-            <a:chOff x="7525181" y="573395"/>
+            <a:off x="5783" y="724358"/>
+            <a:ext cx="360000" cy="360000"/>
+            <a:chOff x="7525180" y="573395"/>
             <a:chExt cx="607143" cy="421014"/>
           </a:xfrm>
         </p:grpSpPr>
@@ -6194,7 +6145,7 @@
           </p:nvSpPr>
           <p:spPr>
             <a:xfrm>
-              <a:off x="7525181" y="573395"/>
+              <a:off x="7525180" y="573395"/>
               <a:ext cx="607143" cy="421014"/>
             </a:xfrm>
             <a:prstGeom prst="rect">
@@ -6447,169 +6398,428 @@
       </p:grpSp>
       <p:grpSp>
         <p:nvGrpSpPr>
-          <p:cNvPr id="5" name="群組 4"/>
+          <p:cNvPr id="11" name="群組 10"/>
           <p:cNvGrpSpPr/>
           <p:nvPr/>
         </p:nvGrpSpPr>
         <p:grpSpPr>
           <a:xfrm>
-            <a:off x="7122707" y="2181615"/>
-            <a:ext cx="1442228" cy="1259357"/>
-            <a:chOff x="7122707" y="2181615"/>
-            <a:chExt cx="1442228" cy="1259357"/>
+            <a:off x="361685" y="0"/>
+            <a:ext cx="360000" cy="360000"/>
+            <a:chOff x="2695061" y="480631"/>
+            <a:chExt cx="360000" cy="360000"/>
           </a:xfrm>
         </p:grpSpPr>
-        <p:pic>
-          <p:nvPicPr>
-            <p:cNvPr id="2" name="圖片 1"/>
-            <p:cNvPicPr>
-              <a:picLocks noChangeAspect="1"/>
-            </p:cNvPicPr>
+        <p:sp>
+          <p:nvSpPr>
+            <p:cNvPr id="80" name="橢圓 79"/>
+            <p:cNvSpPr/>
             <p:nvPr/>
-          </p:nvPicPr>
-          <p:blipFill>
-            <a:blip r:embed="rId2">
-              <a:extLst>
-                <a:ext uri="{28A0092B-C50C-407E-A947-70E740481C1C}">
-                  <a14:useLocalDpi xmlns:a14="http://schemas.microsoft.com/office/drawing/2010/main" val="0"/>
-                </a:ext>
-              </a:extLst>
-            </a:blip>
-            <a:stretch>
-              <a:fillRect/>
-            </a:stretch>
-          </p:blipFill>
+          </p:nvSpPr>
           <p:spPr>
             <a:xfrm>
-              <a:off x="7734586" y="2181615"/>
-              <a:ext cx="215900" cy="927100"/>
+              <a:off x="2695061" y="480631"/>
+              <a:ext cx="360000" cy="360000"/>
             </a:xfrm>
-            <a:prstGeom prst="rect">
+            <a:prstGeom prst="ellipse">
               <a:avLst/>
             </a:prstGeom>
+            <a:solidFill>
+              <a:schemeClr val="accent3"/>
+            </a:solidFill>
+            <a:ln>
+              <a:solidFill>
+                <a:schemeClr val="tx1">
+                  <a:lumMod val="65000"/>
+                  <a:lumOff val="35000"/>
+                </a:schemeClr>
+              </a:solidFill>
+            </a:ln>
           </p:spPr>
-        </p:pic>
-        <p:pic>
-          <p:nvPicPr>
-            <p:cNvPr id="3" name="圖片 2"/>
-            <p:cNvPicPr>
-              <a:picLocks noChangeAspect="1"/>
-            </p:cNvPicPr>
+          <p:style>
+            <a:lnRef idx="2">
+              <a:schemeClr val="accent1">
+                <a:shade val="50000"/>
+              </a:schemeClr>
+            </a:lnRef>
+            <a:fillRef idx="1">
+              <a:schemeClr val="accent1"/>
+            </a:fillRef>
+            <a:effectRef idx="0">
+              <a:schemeClr val="accent1"/>
+            </a:effectRef>
+            <a:fontRef idx="minor">
+              <a:schemeClr val="lt1"/>
+            </a:fontRef>
+          </p:style>
+          <p:txBody>
+            <a:bodyPr rtlCol="0" anchor="ctr"/>
+            <a:lstStyle/>
+            <a:p>
+              <a:pPr algn="ctr"/>
+              <a:endParaRPr kumimoji="1" lang="zh-TW" altLang="en-US"/>
+            </a:p>
+          </p:txBody>
+        </p:sp>
+        <p:sp>
+          <p:nvSpPr>
+            <p:cNvPr id="7" name="橢圓 6"/>
+            <p:cNvSpPr/>
             <p:nvPr/>
-          </p:nvPicPr>
-          <p:blipFill>
-            <a:blip r:embed="rId2">
-              <a:extLst>
-                <a:ext uri="{28A0092B-C50C-407E-A947-70E740481C1C}">
-                  <a14:useLocalDpi xmlns:a14="http://schemas.microsoft.com/office/drawing/2010/main" val="0"/>
-                </a:ext>
-              </a:extLst>
-            </a:blip>
-            <a:stretch>
-              <a:fillRect/>
-            </a:stretch>
-          </p:blipFill>
+          </p:nvSpPr>
+          <p:spPr>
+            <a:xfrm flipH="1" flipV="1">
+              <a:off x="2903353" y="734992"/>
+              <a:ext cx="45719" cy="45719"/>
+            </a:xfrm>
+            <a:prstGeom prst="ellipse">
+              <a:avLst/>
+            </a:prstGeom>
+            <a:solidFill>
+              <a:schemeClr val="tx1">
+                <a:lumMod val="50000"/>
+                <a:lumOff val="50000"/>
+              </a:schemeClr>
+            </a:solidFill>
+            <a:ln>
+              <a:noFill/>
+            </a:ln>
+          </p:spPr>
+          <p:style>
+            <a:lnRef idx="2">
+              <a:schemeClr val="dk1">
+                <a:shade val="50000"/>
+              </a:schemeClr>
+            </a:lnRef>
+            <a:fillRef idx="1">
+              <a:schemeClr val="dk1"/>
+            </a:fillRef>
+            <a:effectRef idx="0">
+              <a:schemeClr val="dk1"/>
+            </a:effectRef>
+            <a:fontRef idx="minor">
+              <a:schemeClr val="lt1"/>
+            </a:fontRef>
+          </p:style>
+          <p:txBody>
+            <a:bodyPr rtlCol="0" anchor="ctr"/>
+            <a:lstStyle/>
+            <a:p>
+              <a:pPr algn="ctr"/>
+              <a:endParaRPr kumimoji="1" lang="zh-TW" altLang="en-US"/>
+            </a:p>
+          </p:txBody>
+        </p:sp>
+        <p:sp>
+          <p:nvSpPr>
+            <p:cNvPr id="83" name="橢圓 82"/>
+            <p:cNvSpPr/>
+            <p:nvPr/>
+          </p:nvSpPr>
+          <p:spPr>
+            <a:xfrm flipH="1" flipV="1">
+              <a:off x="2949072" y="666704"/>
+              <a:ext cx="45719" cy="45719"/>
+            </a:xfrm>
+            <a:prstGeom prst="ellipse">
+              <a:avLst/>
+            </a:prstGeom>
+            <a:solidFill>
+              <a:schemeClr val="tx1">
+                <a:lumMod val="50000"/>
+                <a:lumOff val="50000"/>
+              </a:schemeClr>
+            </a:solidFill>
+            <a:ln>
+              <a:noFill/>
+            </a:ln>
+          </p:spPr>
+          <p:style>
+            <a:lnRef idx="2">
+              <a:schemeClr val="dk1">
+                <a:shade val="50000"/>
+              </a:schemeClr>
+            </a:lnRef>
+            <a:fillRef idx="1">
+              <a:schemeClr val="dk1"/>
+            </a:fillRef>
+            <a:effectRef idx="0">
+              <a:schemeClr val="dk1"/>
+            </a:effectRef>
+            <a:fontRef idx="minor">
+              <a:schemeClr val="lt1"/>
+            </a:fontRef>
+          </p:style>
+          <p:txBody>
+            <a:bodyPr rtlCol="0" anchor="ctr"/>
+            <a:lstStyle/>
+            <a:p>
+              <a:pPr algn="ctr"/>
+              <a:endParaRPr kumimoji="1" lang="zh-TW" altLang="en-US"/>
+            </a:p>
+          </p:txBody>
+        </p:sp>
+        <p:sp>
+          <p:nvSpPr>
+            <p:cNvPr id="84" name="橢圓 83"/>
+            <p:cNvSpPr/>
+            <p:nvPr/>
+          </p:nvSpPr>
+          <p:spPr>
+            <a:xfrm flipH="1" flipV="1">
+              <a:off x="2871509" y="606769"/>
+              <a:ext cx="45719" cy="45719"/>
+            </a:xfrm>
+            <a:prstGeom prst="ellipse">
+              <a:avLst/>
+            </a:prstGeom>
+            <a:solidFill>
+              <a:schemeClr val="tx1">
+                <a:lumMod val="50000"/>
+                <a:lumOff val="50000"/>
+              </a:schemeClr>
+            </a:solidFill>
+            <a:ln>
+              <a:noFill/>
+            </a:ln>
+          </p:spPr>
+          <p:style>
+            <a:lnRef idx="2">
+              <a:schemeClr val="dk1">
+                <a:shade val="50000"/>
+              </a:schemeClr>
+            </a:lnRef>
+            <a:fillRef idx="1">
+              <a:schemeClr val="dk1"/>
+            </a:fillRef>
+            <a:effectRef idx="0">
+              <a:schemeClr val="dk1"/>
+            </a:effectRef>
+            <a:fontRef idx="minor">
+              <a:schemeClr val="lt1"/>
+            </a:fontRef>
+          </p:style>
+          <p:txBody>
+            <a:bodyPr rtlCol="0" anchor="ctr"/>
+            <a:lstStyle/>
+            <a:p>
+              <a:pPr algn="ctr"/>
+              <a:endParaRPr kumimoji="1" lang="zh-TW" altLang="en-US"/>
+            </a:p>
+          </p:txBody>
+        </p:sp>
+      </p:grpSp>
+      <p:grpSp>
+        <p:nvGrpSpPr>
+          <p:cNvPr id="13" name="群組 12"/>
+          <p:cNvGrpSpPr/>
+          <p:nvPr/>
+        </p:nvGrpSpPr>
+        <p:grpSpPr>
+          <a:xfrm>
+            <a:off x="357062" y="364358"/>
+            <a:ext cx="360000" cy="360000"/>
+            <a:chOff x="2695061" y="1006814"/>
+            <a:chExt cx="360000" cy="360000"/>
+          </a:xfrm>
+        </p:grpSpPr>
+        <p:sp>
+          <p:nvSpPr>
+            <p:cNvPr id="88" name="橢圓 87"/>
+            <p:cNvSpPr/>
+            <p:nvPr/>
+          </p:nvSpPr>
           <p:spPr>
             <a:xfrm>
-              <a:off x="8040594" y="2348866"/>
-              <a:ext cx="215900" cy="927100"/>
+              <a:off x="2695061" y="1006814"/>
+              <a:ext cx="360000" cy="360000"/>
             </a:xfrm>
-            <a:prstGeom prst="rect">
+            <a:prstGeom prst="ellipse">
               <a:avLst/>
             </a:prstGeom>
+            <a:solidFill>
+              <a:schemeClr val="accent3"/>
+            </a:solidFill>
+            <a:ln>
+              <a:solidFill>
+                <a:schemeClr val="tx1">
+                  <a:lumMod val="65000"/>
+                  <a:lumOff val="35000"/>
+                </a:schemeClr>
+              </a:solidFill>
+            </a:ln>
           </p:spPr>
-        </p:pic>
-        <p:pic>
-          <p:nvPicPr>
-            <p:cNvPr id="4" name="圖片 3"/>
-            <p:cNvPicPr>
-              <a:picLocks noChangeAspect="1"/>
-            </p:cNvPicPr>
+          <p:style>
+            <a:lnRef idx="2">
+              <a:schemeClr val="accent1">
+                <a:shade val="50000"/>
+              </a:schemeClr>
+            </a:lnRef>
+            <a:fillRef idx="1">
+              <a:schemeClr val="accent1"/>
+            </a:fillRef>
+            <a:effectRef idx="0">
+              <a:schemeClr val="accent1"/>
+            </a:effectRef>
+            <a:fontRef idx="minor">
+              <a:schemeClr val="lt1"/>
+            </a:fontRef>
+          </p:style>
+          <p:txBody>
+            <a:bodyPr rtlCol="0" anchor="ctr"/>
+            <a:lstStyle/>
+            <a:p>
+              <a:pPr algn="ctr"/>
+              <a:endParaRPr kumimoji="1" lang="zh-TW" altLang="en-US"/>
+            </a:p>
+          </p:txBody>
+        </p:sp>
+        <p:sp>
+          <p:nvSpPr>
+            <p:cNvPr id="10" name="爆炸 2 9"/>
+            <p:cNvSpPr/>
             <p:nvPr/>
-          </p:nvPicPr>
-          <p:blipFill>
-            <a:blip r:embed="rId2">
-              <a:extLst>
-                <a:ext uri="{28A0092B-C50C-407E-A947-70E740481C1C}">
-                  <a14:useLocalDpi xmlns:a14="http://schemas.microsoft.com/office/drawing/2010/main" val="0"/>
-                </a:ext>
-              </a:extLst>
-            </a:blip>
-            <a:stretch>
-              <a:fillRect/>
-            </a:stretch>
-          </p:blipFill>
+          </p:nvSpPr>
           <p:spPr>
             <a:xfrm>
-              <a:off x="7428578" y="2348866"/>
-              <a:ext cx="215900" cy="927100"/>
+              <a:off x="2731998" y="1026704"/>
+              <a:ext cx="218383" cy="218383"/>
             </a:xfrm>
-            <a:prstGeom prst="rect">
+            <a:prstGeom prst="irregularSeal2">
               <a:avLst/>
             </a:prstGeom>
+            <a:solidFill>
+              <a:schemeClr val="accent6"/>
+            </a:solidFill>
+            <a:ln>
+              <a:noFill/>
+            </a:ln>
           </p:spPr>
-        </p:pic>
-        <p:pic>
-          <p:nvPicPr>
-            <p:cNvPr id="76" name="圖片 75"/>
-            <p:cNvPicPr>
-              <a:picLocks noChangeAspect="1"/>
-            </p:cNvPicPr>
+          <p:style>
+            <a:lnRef idx="2">
+              <a:schemeClr val="accent1">
+                <a:shade val="50000"/>
+              </a:schemeClr>
+            </a:lnRef>
+            <a:fillRef idx="1">
+              <a:schemeClr val="accent1"/>
+            </a:fillRef>
+            <a:effectRef idx="0">
+              <a:schemeClr val="accent1"/>
+            </a:effectRef>
+            <a:fontRef idx="minor">
+              <a:schemeClr val="lt1"/>
+            </a:fontRef>
+          </p:style>
+          <p:txBody>
+            <a:bodyPr rtlCol="0" anchor="ctr"/>
+            <a:lstStyle/>
+            <a:p>
+              <a:pPr algn="ctr"/>
+              <a:endParaRPr kumimoji="1" lang="zh-TW" altLang="en-US"/>
+            </a:p>
+          </p:txBody>
+        </p:sp>
+        <p:sp>
+          <p:nvSpPr>
+            <p:cNvPr id="90" name="爆炸 2 89"/>
+            <p:cNvSpPr/>
             <p:nvPr/>
-          </p:nvPicPr>
-          <p:blipFill>
-            <a:blip r:embed="rId2">
-              <a:extLst>
-                <a:ext uri="{28A0092B-C50C-407E-A947-70E740481C1C}">
-                  <a14:useLocalDpi xmlns:a14="http://schemas.microsoft.com/office/drawing/2010/main" val="0"/>
-                </a:ext>
-              </a:extLst>
-            </a:blip>
-            <a:stretch>
-              <a:fillRect/>
-            </a:stretch>
-          </p:blipFill>
+          </p:nvSpPr>
           <p:spPr>
-            <a:xfrm>
-              <a:off x="8349035" y="2513872"/>
-              <a:ext cx="215900" cy="927100"/>
+            <a:xfrm rot="3573542">
+              <a:off x="2815501" y="1128836"/>
+              <a:ext cx="151376" cy="151376"/>
             </a:xfrm>
-            <a:prstGeom prst="rect">
+            <a:prstGeom prst="irregularSeal2">
               <a:avLst/>
             </a:prstGeom>
+            <a:solidFill>
+              <a:srgbClr val="49712F">
+                <a:alpha val="59000"/>
+              </a:srgbClr>
+            </a:solidFill>
+            <a:ln>
+              <a:noFill/>
+            </a:ln>
           </p:spPr>
-        </p:pic>
-        <p:pic>
-          <p:nvPicPr>
-            <p:cNvPr id="77" name="圖片 76"/>
-            <p:cNvPicPr>
-              <a:picLocks noChangeAspect="1"/>
-            </p:cNvPicPr>
-            <p:nvPr/>
-          </p:nvPicPr>
-          <p:blipFill>
-            <a:blip r:embed="rId2">
-              <a:extLst>
-                <a:ext uri="{28A0092B-C50C-407E-A947-70E740481C1C}">
-                  <a14:useLocalDpi xmlns:a14="http://schemas.microsoft.com/office/drawing/2010/main" val="0"/>
-                </a:ext>
-              </a:extLst>
-            </a:blip>
-            <a:stretch>
-              <a:fillRect/>
-            </a:stretch>
-          </p:blipFill>
-          <p:spPr>
-            <a:xfrm>
-              <a:off x="7122707" y="2513872"/>
-              <a:ext cx="215900" cy="927100"/>
-            </a:xfrm>
-            <a:prstGeom prst="rect">
-              <a:avLst/>
-            </a:prstGeom>
-          </p:spPr>
-        </p:pic>
+          <p:style>
+            <a:lnRef idx="2">
+              <a:schemeClr val="accent1">
+                <a:shade val="50000"/>
+              </a:schemeClr>
+            </a:lnRef>
+            <a:fillRef idx="1">
+              <a:schemeClr val="accent1"/>
+            </a:fillRef>
+            <a:effectRef idx="0">
+              <a:schemeClr val="accent1"/>
+            </a:effectRef>
+            <a:fontRef idx="minor">
+              <a:schemeClr val="lt1"/>
+            </a:fontRef>
+          </p:style>
+          <p:txBody>
+            <a:bodyPr rtlCol="0" anchor="ctr"/>
+            <a:lstStyle/>
+            <a:p>
+              <a:pPr algn="ctr"/>
+              <a:endParaRPr kumimoji="1" lang="zh-TW" altLang="en-US"/>
+            </a:p>
+          </p:txBody>
+        </p:sp>
       </p:grpSp>
+      <p:sp>
+        <p:nvSpPr>
+          <p:cNvPr id="91" name="橢圓 90"/>
+          <p:cNvSpPr/>
+          <p:nvPr/>
+        </p:nvSpPr>
+        <p:spPr>
+          <a:xfrm>
+            <a:off x="0" y="0"/>
+            <a:ext cx="360000" cy="360000"/>
+          </a:xfrm>
+          <a:prstGeom prst="ellipse">
+            <a:avLst/>
+          </a:prstGeom>
+          <a:solidFill>
+            <a:schemeClr val="accent3"/>
+          </a:solidFill>
+          <a:ln>
+            <a:solidFill>
+              <a:schemeClr val="tx1">
+                <a:lumMod val="65000"/>
+                <a:lumOff val="35000"/>
+              </a:schemeClr>
+            </a:solidFill>
+          </a:ln>
+        </p:spPr>
+        <p:style>
+          <a:lnRef idx="2">
+            <a:schemeClr val="accent1">
+              <a:shade val="50000"/>
+            </a:schemeClr>
+          </a:lnRef>
+          <a:fillRef idx="1">
+            <a:schemeClr val="accent1"/>
+          </a:fillRef>
+          <a:effectRef idx="0">
+            <a:schemeClr val="accent1"/>
+          </a:effectRef>
+          <a:fontRef idx="minor">
+            <a:schemeClr val="lt1"/>
+          </a:fontRef>
+        </p:style>
+        <p:txBody>
+          <a:bodyPr rtlCol="0" anchor="ctr"/>
+          <a:lstStyle/>
+          <a:p>
+            <a:pPr algn="ctr"/>
+            <a:endParaRPr kumimoji="1" lang="zh-TW" altLang="en-US"/>
+          </a:p>
+        </p:txBody>
+      </p:sp>
     </p:spTree>
     <p:extLst>
       <p:ext uri="{BB962C8B-B14F-4D97-AF65-F5344CB8AC3E}">
@@ -6631,6 +6841,78 @@
 </file>
 
 <file path=ppt/slides/slide2.xml><?xml version="1.0" encoding="utf-8"?>
+<p:sld xmlns:a="http://schemas.openxmlformats.org/drawingml/2006/main" xmlns:r="http://schemas.openxmlformats.org/officeDocument/2006/relationships" xmlns:p="http://schemas.openxmlformats.org/presentationml/2006/main">
+  <p:cSld>
+    <p:bg>
+      <p:bgPr>
+        <a:solidFill>
+          <a:schemeClr val="accent6">
+            <a:lumMod val="60000"/>
+            <a:lumOff val="40000"/>
+          </a:schemeClr>
+        </a:solidFill>
+        <a:effectLst/>
+      </p:bgPr>
+    </p:bg>
+    <p:spTree>
+      <p:nvGrpSpPr>
+        <p:cNvPr id="1" name=""/>
+        <p:cNvGrpSpPr/>
+        <p:nvPr/>
+      </p:nvGrpSpPr>
+      <p:grpSpPr>
+        <a:xfrm>
+          <a:off x="0" y="0"/>
+          <a:ext cx="0" cy="0"/>
+          <a:chOff x="0" y="0"/>
+          <a:chExt cx="0" cy="0"/>
+        </a:xfrm>
+      </p:grpSpPr>
+      <p:pic>
+        <p:nvPicPr>
+          <p:cNvPr id="2" name="圖片 1"/>
+          <p:cNvPicPr>
+            <a:picLocks noChangeAspect="1"/>
+          </p:cNvPicPr>
+          <p:nvPr/>
+        </p:nvPicPr>
+        <p:blipFill>
+          <a:blip r:embed="rId2"/>
+          <a:stretch>
+            <a:fillRect/>
+          </a:stretch>
+        </p:blipFill>
+        <p:spPr>
+          <a:xfrm>
+            <a:off x="2273300" y="876300"/>
+            <a:ext cx="7645400" cy="5105400"/>
+          </a:xfrm>
+          <a:prstGeom prst="rect">
+            <a:avLst/>
+          </a:prstGeom>
+        </p:spPr>
+      </p:pic>
+    </p:spTree>
+    <p:extLst>
+      <p:ext uri="{BB962C8B-B14F-4D97-AF65-F5344CB8AC3E}">
+        <p14:creationId xmlns:p14="http://schemas.microsoft.com/office/powerpoint/2010/main" val="929295095"/>
+      </p:ext>
+    </p:extLst>
+  </p:cSld>
+  <p:clrMapOvr>
+    <a:masterClrMapping/>
+  </p:clrMapOvr>
+  <p:timing>
+    <p:tnLst>
+      <p:par>
+        <p:cTn id="1" dur="indefinite" restart="never" nodeType="tmRoot"/>
+      </p:par>
+    </p:tnLst>
+  </p:timing>
+</p:sld>
+</file>
+
+<file path=ppt/slides/slide3.xml><?xml version="1.0" encoding="utf-8"?>
 <p:sld xmlns:a="http://schemas.openxmlformats.org/drawingml/2006/main" xmlns:r="http://schemas.openxmlformats.org/officeDocument/2006/relationships" xmlns:p="http://schemas.openxmlformats.org/presentationml/2006/main">
   <p:cSld>
     <p:spTree>
@@ -7158,6 +7440,36 @@
 </p:sld>
 </file>
 
+<file path=ppt/slides/slide4.xml><?xml version="1.0" encoding="utf-8"?>
+<p:sld xmlns:a="http://schemas.openxmlformats.org/drawingml/2006/main" xmlns:r="http://schemas.openxmlformats.org/officeDocument/2006/relationships" xmlns:p="http://schemas.openxmlformats.org/presentationml/2006/main">
+  <p:cSld>
+    <p:spTree>
+      <p:nvGrpSpPr>
+        <p:cNvPr id="1" name=""/>
+        <p:cNvGrpSpPr/>
+        <p:nvPr/>
+      </p:nvGrpSpPr>
+      <p:grpSpPr>
+        <a:xfrm>
+          <a:off x="0" y="0"/>
+          <a:ext cx="0" cy="0"/>
+          <a:chOff x="0" y="0"/>
+          <a:chExt cx="0" cy="0"/>
+        </a:xfrm>
+      </p:grpSpPr>
+    </p:spTree>
+    <p:extLst>
+      <p:ext uri="{BB962C8B-B14F-4D97-AF65-F5344CB8AC3E}">
+        <p14:creationId xmlns:p14="http://schemas.microsoft.com/office/powerpoint/2010/main" val="414198216"/>
+      </p:ext>
+    </p:extLst>
+  </p:cSld>
+  <p:clrMapOvr>
+    <a:masterClrMapping/>
+  </p:clrMapOvr>
+</p:sld>
+</file>
+
 <file path=ppt/theme/theme1.xml><?xml version="1.0" encoding="utf-8"?>
 <a:theme xmlns:a="http://schemas.openxmlformats.org/drawingml/2006/main" name="Office 佈景主題">
   <a:themeElements>

</xml_diff>

<commit_message>
FirGunShot Added / StartBUtton Redesign
</commit_message>
<xml_diff>
--- a/media/survivEE.pptx
+++ b/media/survivEE.pptx
@@ -12,6 +12,7 @@
     <p:sldId id="258" r:id="rId6"/>
     <p:sldId id="261" r:id="rId7"/>
     <p:sldId id="262" r:id="rId8"/>
+    <p:sldId id="263" r:id="rId9"/>
   </p:sldIdLst>
   <p:sldSz cx="12192000" cy="6858000"/>
   <p:notesSz cx="6858000" cy="9144000"/>
@@ -6908,32 +6909,6 @@
           </a:prstGeom>
         </p:spPr>
       </p:pic>
-      <p:sp>
-        <p:nvSpPr>
-          <p:cNvPr id="8" name="文字方塊 7"/>
-          <p:cNvSpPr txBox="1"/>
-          <p:nvPr/>
-        </p:nvSpPr>
-        <p:spPr>
-          <a:xfrm>
-            <a:off x="-508000" y="-543339"/>
-            <a:ext cx="184731" cy="369332"/>
-          </a:xfrm>
-          <a:prstGeom prst="rect">
-            <a:avLst/>
-          </a:prstGeom>
-          <a:noFill/>
-        </p:spPr>
-        <p:txBody>
-          <a:bodyPr wrap="none" rtlCol="0">
-            <a:spAutoFit/>
-          </a:bodyPr>
-          <a:lstStyle/>
-          <a:p>
-            <a:endParaRPr kumimoji="1" lang="zh-TW" altLang="en-US"/>
-          </a:p>
-        </p:txBody>
-      </p:sp>
     </p:spTree>
     <p:extLst>
       <p:ext uri="{BB962C8B-B14F-4D97-AF65-F5344CB8AC3E}">
@@ -7929,6 +7904,105 @@
 </p:sld>
 </file>
 
+<file path=ppt/slides/slide8.xml><?xml version="1.0" encoding="utf-8"?>
+<p:sld xmlns:a="http://schemas.openxmlformats.org/drawingml/2006/main" xmlns:r="http://schemas.openxmlformats.org/officeDocument/2006/relationships" xmlns:p="http://schemas.openxmlformats.org/presentationml/2006/main">
+  <p:cSld>
+    <p:spTree>
+      <p:nvGrpSpPr>
+        <p:cNvPr id="1" name=""/>
+        <p:cNvGrpSpPr/>
+        <p:nvPr/>
+      </p:nvGrpSpPr>
+      <p:grpSpPr>
+        <a:xfrm>
+          <a:off x="0" y="0"/>
+          <a:ext cx="0" cy="0"/>
+          <a:chOff x="0" y="0"/>
+          <a:chExt cx="0" cy="0"/>
+        </a:xfrm>
+      </p:grpSpPr>
+      <p:sp>
+        <p:nvSpPr>
+          <p:cNvPr id="2" name="標題 1"/>
+          <p:cNvSpPr>
+            <a:spLocks noGrp="1"/>
+          </p:cNvSpPr>
+          <p:nvPr>
+            <p:ph type="title"/>
+          </p:nvPr>
+        </p:nvSpPr>
+        <p:spPr/>
+        <p:txBody>
+          <a:bodyPr/>
+          <a:lstStyle/>
+          <a:p>
+            <a:endParaRPr kumimoji="1" lang="zh-TW" altLang="en-US"/>
+          </a:p>
+        </p:txBody>
+      </p:sp>
+      <p:pic>
+        <p:nvPicPr>
+          <p:cNvPr id="7" name="內容版面配置區 6"/>
+          <p:cNvPicPr>
+            <a:picLocks noGrp="1" noChangeAspect="1"/>
+          </p:cNvPicPr>
+          <p:nvPr>
+            <p:ph idx="1"/>
+          </p:nvPr>
+        </p:nvPicPr>
+        <p:blipFill>
+          <a:blip r:embed="rId2"/>
+          <a:stretch>
+            <a:fillRect/>
+          </a:stretch>
+        </p:blipFill>
+        <p:spPr>
+          <a:xfrm>
+            <a:off x="3916942" y="1825625"/>
+            <a:ext cx="4358115" cy="4351338"/>
+          </a:xfrm>
+          <a:prstGeom prst="rect">
+            <a:avLst/>
+          </a:prstGeom>
+        </p:spPr>
+      </p:pic>
+      <p:pic>
+        <p:nvPicPr>
+          <p:cNvPr id="3" name="圖片 2"/>
+          <p:cNvPicPr>
+            <a:picLocks noChangeAspect="1"/>
+          </p:cNvPicPr>
+          <p:nvPr/>
+        </p:nvPicPr>
+        <p:blipFill>
+          <a:blip r:embed="rId3"/>
+          <a:stretch>
+            <a:fillRect/>
+          </a:stretch>
+        </p:blipFill>
+        <p:spPr>
+          <a:xfrm>
+            <a:off x="342900" y="2324100"/>
+            <a:ext cx="11506200" cy="2209800"/>
+          </a:xfrm>
+          <a:prstGeom prst="rect">
+            <a:avLst/>
+          </a:prstGeom>
+        </p:spPr>
+      </p:pic>
+    </p:spTree>
+    <p:extLst>
+      <p:ext uri="{BB962C8B-B14F-4D97-AF65-F5344CB8AC3E}">
+        <p14:creationId xmlns:p14="http://schemas.microsoft.com/office/powerpoint/2010/main" val="79962676"/>
+      </p:ext>
+    </p:extLst>
+  </p:cSld>
+  <p:clrMapOvr>
+    <a:masterClrMapping/>
+  </p:clrMapOvr>
+</p:sld>
+</file>
+
 <file path=ppt/theme/theme1.xml><?xml version="1.0" encoding="utf-8"?>
 <a:theme xmlns:a="http://schemas.openxmlformats.org/drawingml/2006/main" name="Office 佈景主題">
   <a:themeElements>

</xml_diff>

<commit_message>
Ammo Limited Function Added
</commit_message>
<xml_diff>
--- a/media/survivEE.pptx
+++ b/media/survivEE.pptx
@@ -250,7 +250,7 @@
           <a:p>
             <a:fld id="{53AECEED-77F7-4C49-B070-DA58E18B350F}" type="datetimeFigureOut">
               <a:rPr kumimoji="1" lang="zh-TW" altLang="en-US" smtClean="0"/>
-              <a:t>2019/1/5</a:t>
+              <a:t>2019/1/6</a:t>
             </a:fld>
             <a:endParaRPr kumimoji="1" lang="zh-TW" altLang="en-US"/>
           </a:p>
@@ -420,7 +420,7 @@
           <a:p>
             <a:fld id="{53AECEED-77F7-4C49-B070-DA58E18B350F}" type="datetimeFigureOut">
               <a:rPr kumimoji="1" lang="zh-TW" altLang="en-US" smtClean="0"/>
-              <a:t>2019/1/5</a:t>
+              <a:t>2019/1/6</a:t>
             </a:fld>
             <a:endParaRPr kumimoji="1" lang="zh-TW" altLang="en-US"/>
           </a:p>
@@ -600,7 +600,7 @@
           <a:p>
             <a:fld id="{53AECEED-77F7-4C49-B070-DA58E18B350F}" type="datetimeFigureOut">
               <a:rPr kumimoji="1" lang="zh-TW" altLang="en-US" smtClean="0"/>
-              <a:t>2019/1/5</a:t>
+              <a:t>2019/1/6</a:t>
             </a:fld>
             <a:endParaRPr kumimoji="1" lang="zh-TW" altLang="en-US"/>
           </a:p>
@@ -770,7 +770,7 @@
           <a:p>
             <a:fld id="{53AECEED-77F7-4C49-B070-DA58E18B350F}" type="datetimeFigureOut">
               <a:rPr kumimoji="1" lang="zh-TW" altLang="en-US" smtClean="0"/>
-              <a:t>2019/1/5</a:t>
+              <a:t>2019/1/6</a:t>
             </a:fld>
             <a:endParaRPr kumimoji="1" lang="zh-TW" altLang="en-US"/>
           </a:p>
@@ -1016,7 +1016,7 @@
           <a:p>
             <a:fld id="{53AECEED-77F7-4C49-B070-DA58E18B350F}" type="datetimeFigureOut">
               <a:rPr kumimoji="1" lang="zh-TW" altLang="en-US" smtClean="0"/>
-              <a:t>2019/1/5</a:t>
+              <a:t>2019/1/6</a:t>
             </a:fld>
             <a:endParaRPr kumimoji="1" lang="zh-TW" altLang="en-US"/>
           </a:p>
@@ -1248,7 +1248,7 @@
           <a:p>
             <a:fld id="{53AECEED-77F7-4C49-B070-DA58E18B350F}" type="datetimeFigureOut">
               <a:rPr kumimoji="1" lang="zh-TW" altLang="en-US" smtClean="0"/>
-              <a:t>2019/1/5</a:t>
+              <a:t>2019/1/6</a:t>
             </a:fld>
             <a:endParaRPr kumimoji="1" lang="zh-TW" altLang="en-US"/>
           </a:p>
@@ -1615,7 +1615,7 @@
           <a:p>
             <a:fld id="{53AECEED-77F7-4C49-B070-DA58E18B350F}" type="datetimeFigureOut">
               <a:rPr kumimoji="1" lang="zh-TW" altLang="en-US" smtClean="0"/>
-              <a:t>2019/1/5</a:t>
+              <a:t>2019/1/6</a:t>
             </a:fld>
             <a:endParaRPr kumimoji="1" lang="zh-TW" altLang="en-US"/>
           </a:p>
@@ -1733,7 +1733,7 @@
           <a:p>
             <a:fld id="{53AECEED-77F7-4C49-B070-DA58E18B350F}" type="datetimeFigureOut">
               <a:rPr kumimoji="1" lang="zh-TW" altLang="en-US" smtClean="0"/>
-              <a:t>2019/1/5</a:t>
+              <a:t>2019/1/6</a:t>
             </a:fld>
             <a:endParaRPr kumimoji="1" lang="zh-TW" altLang="en-US"/>
           </a:p>
@@ -1828,7 +1828,7 @@
           <a:p>
             <a:fld id="{53AECEED-77F7-4C49-B070-DA58E18B350F}" type="datetimeFigureOut">
               <a:rPr kumimoji="1" lang="zh-TW" altLang="en-US" smtClean="0"/>
-              <a:t>2019/1/5</a:t>
+              <a:t>2019/1/6</a:t>
             </a:fld>
             <a:endParaRPr kumimoji="1" lang="zh-TW" altLang="en-US"/>
           </a:p>
@@ -2105,7 +2105,7 @@
           <a:p>
             <a:fld id="{53AECEED-77F7-4C49-B070-DA58E18B350F}" type="datetimeFigureOut">
               <a:rPr kumimoji="1" lang="zh-TW" altLang="en-US" smtClean="0"/>
-              <a:t>2019/1/5</a:t>
+              <a:t>2019/1/6</a:t>
             </a:fld>
             <a:endParaRPr kumimoji="1" lang="zh-TW" altLang="en-US"/>
           </a:p>
@@ -2358,7 +2358,7 @@
           <a:p>
             <a:fld id="{53AECEED-77F7-4C49-B070-DA58E18B350F}" type="datetimeFigureOut">
               <a:rPr kumimoji="1" lang="zh-TW" altLang="en-US" smtClean="0"/>
-              <a:t>2019/1/5</a:t>
+              <a:t>2019/1/6</a:t>
             </a:fld>
             <a:endParaRPr kumimoji="1" lang="zh-TW" altLang="en-US"/>
           </a:p>
@@ -2571,7 +2571,7 @@
           <a:p>
             <a:fld id="{53AECEED-77F7-4C49-B070-DA58E18B350F}" type="datetimeFigureOut">
               <a:rPr kumimoji="1" lang="zh-TW" altLang="en-US" smtClean="0"/>
-              <a:t>2019/1/5</a:t>
+              <a:t>2019/1/6</a:t>
             </a:fld>
             <a:endParaRPr kumimoji="1" lang="zh-TW" altLang="en-US"/>
           </a:p>
@@ -7990,6 +7990,30 @@
           </a:prstGeom>
         </p:spPr>
       </p:pic>
+      <p:pic>
+        <p:nvPicPr>
+          <p:cNvPr id="4" name="圖片 3"/>
+          <p:cNvPicPr>
+            <a:picLocks noChangeAspect="1"/>
+          </p:cNvPicPr>
+          <p:nvPr/>
+        </p:nvPicPr>
+        <p:blipFill>
+          <a:blip r:embed="rId4"/>
+          <a:stretch>
+            <a:fillRect/>
+          </a:stretch>
+        </p:blipFill>
+        <p:spPr>
+          <a:xfrm>
+            <a:off x="952500" y="0"/>
+            <a:ext cx="10287000" cy="6858000"/>
+          </a:xfrm>
+          <a:prstGeom prst="rect">
+            <a:avLst/>
+          </a:prstGeom>
+        </p:spPr>
+      </p:pic>
     </p:spTree>
     <p:extLst>
       <p:ext uri="{BB962C8B-B14F-4D97-AF65-F5344CB8AC3E}">

</xml_diff>